<commit_message>
Added docker image and docker pull ppt
</commit_message>
<xml_diff>
--- a/05_Docker_Architecture.pptx
+++ b/05_Docker_Architecture.pptx
@@ -134,7 +134,7 @@
           <p:cNvPr id="2" name="Title 1">
             <a:extLst>
               <a:ext uri="{FF2B5EF4-FFF2-40B4-BE49-F238E27FC236}">
-                <a16:creationId xmlns:a16="http://schemas.microsoft.com/office/drawing/2014/main" id="{0917DCE8-B744-8160-AE3F-8DD8084ADF4A}"/>
+                <a16:creationId xmlns:a16="http://schemas.microsoft.com/office/drawing/2014/main" id="{0F3905BA-E329-7906-FD04-D0B9A29BA9B5}"/>
               </a:ext>
             </a:extLst>
           </p:cNvPr>
@@ -172,7 +172,7 @@
           <p:cNvPr id="3" name="Subtitle 2">
             <a:extLst>
               <a:ext uri="{FF2B5EF4-FFF2-40B4-BE49-F238E27FC236}">
-                <a16:creationId xmlns:a16="http://schemas.microsoft.com/office/drawing/2014/main" id="{280442FA-9C3B-954E-80FA-A30899346D01}"/>
+                <a16:creationId xmlns:a16="http://schemas.microsoft.com/office/drawing/2014/main" id="{3FF694A0-BBFA-8451-762D-95D54B5E2C19}"/>
               </a:ext>
             </a:extLst>
           </p:cNvPr>
@@ -243,7 +243,7 @@
           <p:cNvPr id="4" name="Date Placeholder 3">
             <a:extLst>
               <a:ext uri="{FF2B5EF4-FFF2-40B4-BE49-F238E27FC236}">
-                <a16:creationId xmlns:a16="http://schemas.microsoft.com/office/drawing/2014/main" id="{F5C7707F-DD21-0E23-F345-36075CC35B04}"/>
+                <a16:creationId xmlns:a16="http://schemas.microsoft.com/office/drawing/2014/main" id="{D1BBBF20-AEC2-DFB3-3AA0-F300EC4DC2AD}"/>
               </a:ext>
             </a:extLst>
           </p:cNvPr>
@@ -259,9 +259,9 @@
           <a:bodyPr/>
           <a:lstStyle/>
           <a:p>
-            <a:fld id="{38FBDE99-7FF3-4B2B-B24A-FAE4D0EE83AD}" type="datetimeFigureOut">
+            <a:fld id="{58478983-EB23-43A1-9ED0-C435A70E79D8}" type="datetimeFigureOut">
               <a:rPr lang="en-IN" smtClean="0"/>
-              <a:t>20-10-2025</a:t>
+              <a:t>29-10-2025</a:t>
             </a:fld>
             <a:endParaRPr lang="en-IN"/>
           </a:p>
@@ -272,7 +272,7 @@
           <p:cNvPr id="5" name="Footer Placeholder 4">
             <a:extLst>
               <a:ext uri="{FF2B5EF4-FFF2-40B4-BE49-F238E27FC236}">
-                <a16:creationId xmlns:a16="http://schemas.microsoft.com/office/drawing/2014/main" id="{15FB466B-DE04-B299-C99C-51F46613ED35}"/>
+                <a16:creationId xmlns:a16="http://schemas.microsoft.com/office/drawing/2014/main" id="{8BBEC25E-5CC0-0F99-BFA0-0D237CFBA065}"/>
               </a:ext>
             </a:extLst>
           </p:cNvPr>
@@ -297,7 +297,7 @@
           <p:cNvPr id="6" name="Slide Number Placeholder 5">
             <a:extLst>
               <a:ext uri="{FF2B5EF4-FFF2-40B4-BE49-F238E27FC236}">
-                <a16:creationId xmlns:a16="http://schemas.microsoft.com/office/drawing/2014/main" id="{0803EB04-4F3B-03F9-CB22-FF3A43C5AFB5}"/>
+                <a16:creationId xmlns:a16="http://schemas.microsoft.com/office/drawing/2014/main" id="{451136D2-A8C7-3B4D-2F9E-65FCC9C41757}"/>
               </a:ext>
             </a:extLst>
           </p:cNvPr>
@@ -313,7 +313,7 @@
           <a:bodyPr/>
           <a:lstStyle/>
           <a:p>
-            <a:fld id="{250B4845-9CB7-44A7-AE6D-315ACAC19406}" type="slidenum">
+            <a:fld id="{5E132880-87CE-4965-B154-3BB573D01981}" type="slidenum">
               <a:rPr lang="en-IN" smtClean="0"/>
               <a:t>‹#›</a:t>
             </a:fld>
@@ -324,7 +324,7 @@
     </p:spTree>
     <p:extLst>
       <p:ext uri="{BB962C8B-B14F-4D97-AF65-F5344CB8AC3E}">
-        <p14:creationId xmlns:p14="http://schemas.microsoft.com/office/powerpoint/2010/main" val="2545225102"/>
+        <p14:creationId xmlns:p14="http://schemas.microsoft.com/office/powerpoint/2010/main" val="2177760860"/>
       </p:ext>
     </p:extLst>
   </p:cSld>
@@ -356,7 +356,7 @@
           <p:cNvPr id="2" name="Title 1">
             <a:extLst>
               <a:ext uri="{FF2B5EF4-FFF2-40B4-BE49-F238E27FC236}">
-                <a16:creationId xmlns:a16="http://schemas.microsoft.com/office/drawing/2014/main" id="{B895FC9F-BA7D-8133-6030-A08279A1A542}"/>
+                <a16:creationId xmlns:a16="http://schemas.microsoft.com/office/drawing/2014/main" id="{A17A027C-8F78-1920-9A9A-1E0D1435B2F9}"/>
               </a:ext>
             </a:extLst>
           </p:cNvPr>
@@ -385,7 +385,7 @@
           <p:cNvPr id="3" name="Vertical Text Placeholder 2">
             <a:extLst>
               <a:ext uri="{FF2B5EF4-FFF2-40B4-BE49-F238E27FC236}">
-                <a16:creationId xmlns:a16="http://schemas.microsoft.com/office/drawing/2014/main" id="{691E482E-ED21-DB34-D99B-2AEB47BF6A4D}"/>
+                <a16:creationId xmlns:a16="http://schemas.microsoft.com/office/drawing/2014/main" id="{7489A815-9163-7412-72BF-FD6718A57E33}"/>
               </a:ext>
             </a:extLst>
           </p:cNvPr>
@@ -443,7 +443,7 @@
           <p:cNvPr id="4" name="Date Placeholder 3">
             <a:extLst>
               <a:ext uri="{FF2B5EF4-FFF2-40B4-BE49-F238E27FC236}">
-                <a16:creationId xmlns:a16="http://schemas.microsoft.com/office/drawing/2014/main" id="{7FE35A1F-4492-3706-DBB3-6AD3E4B21945}"/>
+                <a16:creationId xmlns:a16="http://schemas.microsoft.com/office/drawing/2014/main" id="{2E95BC73-5F7C-2D8F-E44A-691AFC59751B}"/>
               </a:ext>
             </a:extLst>
           </p:cNvPr>
@@ -459,9 +459,9 @@
           <a:bodyPr/>
           <a:lstStyle/>
           <a:p>
-            <a:fld id="{38FBDE99-7FF3-4B2B-B24A-FAE4D0EE83AD}" type="datetimeFigureOut">
+            <a:fld id="{58478983-EB23-43A1-9ED0-C435A70E79D8}" type="datetimeFigureOut">
               <a:rPr lang="en-IN" smtClean="0"/>
-              <a:t>20-10-2025</a:t>
+              <a:t>29-10-2025</a:t>
             </a:fld>
             <a:endParaRPr lang="en-IN"/>
           </a:p>
@@ -472,7 +472,7 @@
           <p:cNvPr id="5" name="Footer Placeholder 4">
             <a:extLst>
               <a:ext uri="{FF2B5EF4-FFF2-40B4-BE49-F238E27FC236}">
-                <a16:creationId xmlns:a16="http://schemas.microsoft.com/office/drawing/2014/main" id="{32034E2F-314B-C04C-4CB4-63A92C4C648B}"/>
+                <a16:creationId xmlns:a16="http://schemas.microsoft.com/office/drawing/2014/main" id="{5A0EAEED-4DFD-87F8-ED1E-C80DB60B5BA5}"/>
               </a:ext>
             </a:extLst>
           </p:cNvPr>
@@ -497,7 +497,7 @@
           <p:cNvPr id="6" name="Slide Number Placeholder 5">
             <a:extLst>
               <a:ext uri="{FF2B5EF4-FFF2-40B4-BE49-F238E27FC236}">
-                <a16:creationId xmlns:a16="http://schemas.microsoft.com/office/drawing/2014/main" id="{FDB43F92-5FAE-721E-3150-945713F28205}"/>
+                <a16:creationId xmlns:a16="http://schemas.microsoft.com/office/drawing/2014/main" id="{B744475C-2EB0-3BA2-2537-0D366DEE8517}"/>
               </a:ext>
             </a:extLst>
           </p:cNvPr>
@@ -513,7 +513,7 @@
           <a:bodyPr/>
           <a:lstStyle/>
           <a:p>
-            <a:fld id="{250B4845-9CB7-44A7-AE6D-315ACAC19406}" type="slidenum">
+            <a:fld id="{5E132880-87CE-4965-B154-3BB573D01981}" type="slidenum">
               <a:rPr lang="en-IN" smtClean="0"/>
               <a:t>‹#›</a:t>
             </a:fld>
@@ -524,7 +524,7 @@
     </p:spTree>
     <p:extLst>
       <p:ext uri="{BB962C8B-B14F-4D97-AF65-F5344CB8AC3E}">
-        <p14:creationId xmlns:p14="http://schemas.microsoft.com/office/powerpoint/2010/main" val="1758913778"/>
+        <p14:creationId xmlns:p14="http://schemas.microsoft.com/office/powerpoint/2010/main" val="3553775960"/>
       </p:ext>
     </p:extLst>
   </p:cSld>
@@ -556,7 +556,7 @@
           <p:cNvPr id="2" name="Vertical Title 1">
             <a:extLst>
               <a:ext uri="{FF2B5EF4-FFF2-40B4-BE49-F238E27FC236}">
-                <a16:creationId xmlns:a16="http://schemas.microsoft.com/office/drawing/2014/main" id="{6091AF32-2A97-E80A-30A0-63CA9E2EAE30}"/>
+                <a16:creationId xmlns:a16="http://schemas.microsoft.com/office/drawing/2014/main" id="{94018248-2B90-FD22-8853-FFC4FCE45126}"/>
               </a:ext>
             </a:extLst>
           </p:cNvPr>
@@ -590,7 +590,7 @@
           <p:cNvPr id="3" name="Vertical Text Placeholder 2">
             <a:extLst>
               <a:ext uri="{FF2B5EF4-FFF2-40B4-BE49-F238E27FC236}">
-                <a16:creationId xmlns:a16="http://schemas.microsoft.com/office/drawing/2014/main" id="{D0DE64E0-D0C7-84AE-0FC9-D0A71E251014}"/>
+                <a16:creationId xmlns:a16="http://schemas.microsoft.com/office/drawing/2014/main" id="{4290BEDE-D68D-85CE-1834-21B09F531AEC}"/>
               </a:ext>
             </a:extLst>
           </p:cNvPr>
@@ -653,7 +653,7 @@
           <p:cNvPr id="4" name="Date Placeholder 3">
             <a:extLst>
               <a:ext uri="{FF2B5EF4-FFF2-40B4-BE49-F238E27FC236}">
-                <a16:creationId xmlns:a16="http://schemas.microsoft.com/office/drawing/2014/main" id="{D8372FCE-F86D-F37F-54D7-B9DD9A12F4FE}"/>
+                <a16:creationId xmlns:a16="http://schemas.microsoft.com/office/drawing/2014/main" id="{3D34EC29-FBEF-9D72-E43E-4A051317C75B}"/>
               </a:ext>
             </a:extLst>
           </p:cNvPr>
@@ -669,9 +669,9 @@
           <a:bodyPr/>
           <a:lstStyle/>
           <a:p>
-            <a:fld id="{38FBDE99-7FF3-4B2B-B24A-FAE4D0EE83AD}" type="datetimeFigureOut">
+            <a:fld id="{58478983-EB23-43A1-9ED0-C435A70E79D8}" type="datetimeFigureOut">
               <a:rPr lang="en-IN" smtClean="0"/>
-              <a:t>20-10-2025</a:t>
+              <a:t>29-10-2025</a:t>
             </a:fld>
             <a:endParaRPr lang="en-IN"/>
           </a:p>
@@ -682,7 +682,7 @@
           <p:cNvPr id="5" name="Footer Placeholder 4">
             <a:extLst>
               <a:ext uri="{FF2B5EF4-FFF2-40B4-BE49-F238E27FC236}">
-                <a16:creationId xmlns:a16="http://schemas.microsoft.com/office/drawing/2014/main" id="{16EA0C31-9191-3C9D-4497-08D179625F3F}"/>
+                <a16:creationId xmlns:a16="http://schemas.microsoft.com/office/drawing/2014/main" id="{A2275118-F273-7D86-255A-289BEEEE40EE}"/>
               </a:ext>
             </a:extLst>
           </p:cNvPr>
@@ -707,7 +707,7 @@
           <p:cNvPr id="6" name="Slide Number Placeholder 5">
             <a:extLst>
               <a:ext uri="{FF2B5EF4-FFF2-40B4-BE49-F238E27FC236}">
-                <a16:creationId xmlns:a16="http://schemas.microsoft.com/office/drawing/2014/main" id="{5401555E-945F-DC4B-3381-D95FA2D4D664}"/>
+                <a16:creationId xmlns:a16="http://schemas.microsoft.com/office/drawing/2014/main" id="{72C8AFAB-AF62-154D-1697-983416C7957E}"/>
               </a:ext>
             </a:extLst>
           </p:cNvPr>
@@ -723,7 +723,7 @@
           <a:bodyPr/>
           <a:lstStyle/>
           <a:p>
-            <a:fld id="{250B4845-9CB7-44A7-AE6D-315ACAC19406}" type="slidenum">
+            <a:fld id="{5E132880-87CE-4965-B154-3BB573D01981}" type="slidenum">
               <a:rPr lang="en-IN" smtClean="0"/>
               <a:t>‹#›</a:t>
             </a:fld>
@@ -734,7 +734,7 @@
     </p:spTree>
     <p:extLst>
       <p:ext uri="{BB962C8B-B14F-4D97-AF65-F5344CB8AC3E}">
-        <p14:creationId xmlns:p14="http://schemas.microsoft.com/office/powerpoint/2010/main" val="1996655596"/>
+        <p14:creationId xmlns:p14="http://schemas.microsoft.com/office/powerpoint/2010/main" val="3162474310"/>
       </p:ext>
     </p:extLst>
   </p:cSld>
@@ -766,7 +766,7 @@
           <p:cNvPr id="2" name="Title 1">
             <a:extLst>
               <a:ext uri="{FF2B5EF4-FFF2-40B4-BE49-F238E27FC236}">
-                <a16:creationId xmlns:a16="http://schemas.microsoft.com/office/drawing/2014/main" id="{2A155345-B78F-7B12-DCB5-6E87CFFFC69E}"/>
+                <a16:creationId xmlns:a16="http://schemas.microsoft.com/office/drawing/2014/main" id="{AAF318B6-05AA-F5A4-0817-4AEEAC946221}"/>
               </a:ext>
             </a:extLst>
           </p:cNvPr>
@@ -795,7 +795,7 @@
           <p:cNvPr id="3" name="Content Placeholder 2">
             <a:extLst>
               <a:ext uri="{FF2B5EF4-FFF2-40B4-BE49-F238E27FC236}">
-                <a16:creationId xmlns:a16="http://schemas.microsoft.com/office/drawing/2014/main" id="{4E3B8E86-D648-B598-0268-96A58D3B76C4}"/>
+                <a16:creationId xmlns:a16="http://schemas.microsoft.com/office/drawing/2014/main" id="{29ACE582-B662-0AEF-52EB-CFAB5A7FD4C9}"/>
               </a:ext>
             </a:extLst>
           </p:cNvPr>
@@ -853,7 +853,7 @@
           <p:cNvPr id="4" name="Date Placeholder 3">
             <a:extLst>
               <a:ext uri="{FF2B5EF4-FFF2-40B4-BE49-F238E27FC236}">
-                <a16:creationId xmlns:a16="http://schemas.microsoft.com/office/drawing/2014/main" id="{398E7C8C-2F4B-541D-E3E2-A2F493F1EA9B}"/>
+                <a16:creationId xmlns:a16="http://schemas.microsoft.com/office/drawing/2014/main" id="{31376204-DB50-6D93-DCFB-F20CC472E987}"/>
               </a:ext>
             </a:extLst>
           </p:cNvPr>
@@ -869,9 +869,9 @@
           <a:bodyPr/>
           <a:lstStyle/>
           <a:p>
-            <a:fld id="{38FBDE99-7FF3-4B2B-B24A-FAE4D0EE83AD}" type="datetimeFigureOut">
+            <a:fld id="{58478983-EB23-43A1-9ED0-C435A70E79D8}" type="datetimeFigureOut">
               <a:rPr lang="en-IN" smtClean="0"/>
-              <a:t>20-10-2025</a:t>
+              <a:t>29-10-2025</a:t>
             </a:fld>
             <a:endParaRPr lang="en-IN"/>
           </a:p>
@@ -882,7 +882,7 @@
           <p:cNvPr id="5" name="Footer Placeholder 4">
             <a:extLst>
               <a:ext uri="{FF2B5EF4-FFF2-40B4-BE49-F238E27FC236}">
-                <a16:creationId xmlns:a16="http://schemas.microsoft.com/office/drawing/2014/main" id="{591A7725-6441-912B-3D94-3B69DB777EB7}"/>
+                <a16:creationId xmlns:a16="http://schemas.microsoft.com/office/drawing/2014/main" id="{DC3ED5A5-AB07-5540-C6CB-7C81893078A9}"/>
               </a:ext>
             </a:extLst>
           </p:cNvPr>
@@ -907,7 +907,7 @@
           <p:cNvPr id="6" name="Slide Number Placeholder 5">
             <a:extLst>
               <a:ext uri="{FF2B5EF4-FFF2-40B4-BE49-F238E27FC236}">
-                <a16:creationId xmlns:a16="http://schemas.microsoft.com/office/drawing/2014/main" id="{EC660E0B-9C7C-F9FE-8283-4AAE08CFDFDE}"/>
+                <a16:creationId xmlns:a16="http://schemas.microsoft.com/office/drawing/2014/main" id="{0050FFE3-2F75-12D4-75AB-3F5C8C6F049C}"/>
               </a:ext>
             </a:extLst>
           </p:cNvPr>
@@ -923,7 +923,7 @@
           <a:bodyPr/>
           <a:lstStyle/>
           <a:p>
-            <a:fld id="{250B4845-9CB7-44A7-AE6D-315ACAC19406}" type="slidenum">
+            <a:fld id="{5E132880-87CE-4965-B154-3BB573D01981}" type="slidenum">
               <a:rPr lang="en-IN" smtClean="0"/>
               <a:t>‹#›</a:t>
             </a:fld>
@@ -934,7 +934,7 @@
     </p:spTree>
     <p:extLst>
       <p:ext uri="{BB962C8B-B14F-4D97-AF65-F5344CB8AC3E}">
-        <p14:creationId xmlns:p14="http://schemas.microsoft.com/office/powerpoint/2010/main" val="705339343"/>
+        <p14:creationId xmlns:p14="http://schemas.microsoft.com/office/powerpoint/2010/main" val="3306731160"/>
       </p:ext>
     </p:extLst>
   </p:cSld>
@@ -966,7 +966,7 @@
           <p:cNvPr id="2" name="Title 1">
             <a:extLst>
               <a:ext uri="{FF2B5EF4-FFF2-40B4-BE49-F238E27FC236}">
-                <a16:creationId xmlns:a16="http://schemas.microsoft.com/office/drawing/2014/main" id="{97215155-3AC4-4F4C-68A0-6958B63B0409}"/>
+                <a16:creationId xmlns:a16="http://schemas.microsoft.com/office/drawing/2014/main" id="{3C589043-2C7D-5C1A-D788-F0CB941BDA1D}"/>
               </a:ext>
             </a:extLst>
           </p:cNvPr>
@@ -1004,7 +1004,7 @@
           <p:cNvPr id="3" name="Text Placeholder 2">
             <a:extLst>
               <a:ext uri="{FF2B5EF4-FFF2-40B4-BE49-F238E27FC236}">
-                <a16:creationId xmlns:a16="http://schemas.microsoft.com/office/drawing/2014/main" id="{81785EDE-06DB-5B22-87CB-BA4543DDFF65}"/>
+                <a16:creationId xmlns:a16="http://schemas.microsoft.com/office/drawing/2014/main" id="{45BABC84-757B-C21C-E89A-1B48E334DD17}"/>
               </a:ext>
             </a:extLst>
           </p:cNvPr>
@@ -1129,7 +1129,7 @@
           <p:cNvPr id="4" name="Date Placeholder 3">
             <a:extLst>
               <a:ext uri="{FF2B5EF4-FFF2-40B4-BE49-F238E27FC236}">
-                <a16:creationId xmlns:a16="http://schemas.microsoft.com/office/drawing/2014/main" id="{088ACAD3-21CB-4EFC-9871-361100EDDD3B}"/>
+                <a16:creationId xmlns:a16="http://schemas.microsoft.com/office/drawing/2014/main" id="{1CD61836-D496-410E-76DD-3AB07B071062}"/>
               </a:ext>
             </a:extLst>
           </p:cNvPr>
@@ -1145,9 +1145,9 @@
           <a:bodyPr/>
           <a:lstStyle/>
           <a:p>
-            <a:fld id="{38FBDE99-7FF3-4B2B-B24A-FAE4D0EE83AD}" type="datetimeFigureOut">
+            <a:fld id="{58478983-EB23-43A1-9ED0-C435A70E79D8}" type="datetimeFigureOut">
               <a:rPr lang="en-IN" smtClean="0"/>
-              <a:t>20-10-2025</a:t>
+              <a:t>29-10-2025</a:t>
             </a:fld>
             <a:endParaRPr lang="en-IN"/>
           </a:p>
@@ -1158,7 +1158,7 @@
           <p:cNvPr id="5" name="Footer Placeholder 4">
             <a:extLst>
               <a:ext uri="{FF2B5EF4-FFF2-40B4-BE49-F238E27FC236}">
-                <a16:creationId xmlns:a16="http://schemas.microsoft.com/office/drawing/2014/main" id="{7447E3F2-3C26-113A-709A-D5A02DEAAA8F}"/>
+                <a16:creationId xmlns:a16="http://schemas.microsoft.com/office/drawing/2014/main" id="{4EE86CA6-9231-21BF-E191-1B928A7D27F7}"/>
               </a:ext>
             </a:extLst>
           </p:cNvPr>
@@ -1183,7 +1183,7 @@
           <p:cNvPr id="6" name="Slide Number Placeholder 5">
             <a:extLst>
               <a:ext uri="{FF2B5EF4-FFF2-40B4-BE49-F238E27FC236}">
-                <a16:creationId xmlns:a16="http://schemas.microsoft.com/office/drawing/2014/main" id="{A4D1EBA8-5373-050B-1C1C-01E4643721AE}"/>
+                <a16:creationId xmlns:a16="http://schemas.microsoft.com/office/drawing/2014/main" id="{EFFF30D2-7919-2A53-59A0-D8BEFC04A8FA}"/>
               </a:ext>
             </a:extLst>
           </p:cNvPr>
@@ -1199,7 +1199,7 @@
           <a:bodyPr/>
           <a:lstStyle/>
           <a:p>
-            <a:fld id="{250B4845-9CB7-44A7-AE6D-315ACAC19406}" type="slidenum">
+            <a:fld id="{5E132880-87CE-4965-B154-3BB573D01981}" type="slidenum">
               <a:rPr lang="en-IN" smtClean="0"/>
               <a:t>‹#›</a:t>
             </a:fld>
@@ -1210,7 +1210,7 @@
     </p:spTree>
     <p:extLst>
       <p:ext uri="{BB962C8B-B14F-4D97-AF65-F5344CB8AC3E}">
-        <p14:creationId xmlns:p14="http://schemas.microsoft.com/office/powerpoint/2010/main" val="2775270538"/>
+        <p14:creationId xmlns:p14="http://schemas.microsoft.com/office/powerpoint/2010/main" val="2686295566"/>
       </p:ext>
     </p:extLst>
   </p:cSld>
@@ -1242,7 +1242,7 @@
           <p:cNvPr id="2" name="Title 1">
             <a:extLst>
               <a:ext uri="{FF2B5EF4-FFF2-40B4-BE49-F238E27FC236}">
-                <a16:creationId xmlns:a16="http://schemas.microsoft.com/office/drawing/2014/main" id="{BC8F808B-0071-06CB-2E51-DA64875CC224}"/>
+                <a16:creationId xmlns:a16="http://schemas.microsoft.com/office/drawing/2014/main" id="{883A644A-F1F9-5ADB-BFB6-929F52F69AB9}"/>
               </a:ext>
             </a:extLst>
           </p:cNvPr>
@@ -1271,7 +1271,7 @@
           <p:cNvPr id="3" name="Content Placeholder 2">
             <a:extLst>
               <a:ext uri="{FF2B5EF4-FFF2-40B4-BE49-F238E27FC236}">
-                <a16:creationId xmlns:a16="http://schemas.microsoft.com/office/drawing/2014/main" id="{DCA01A56-0C33-FA76-2374-29D89E58AA51}"/>
+                <a16:creationId xmlns:a16="http://schemas.microsoft.com/office/drawing/2014/main" id="{565B8E5E-D113-C529-08B9-33A55B449ACD}"/>
               </a:ext>
             </a:extLst>
           </p:cNvPr>
@@ -1334,7 +1334,7 @@
           <p:cNvPr id="4" name="Content Placeholder 3">
             <a:extLst>
               <a:ext uri="{FF2B5EF4-FFF2-40B4-BE49-F238E27FC236}">
-                <a16:creationId xmlns:a16="http://schemas.microsoft.com/office/drawing/2014/main" id="{262765DB-DE6A-770D-4DD4-85AE314170A8}"/>
+                <a16:creationId xmlns:a16="http://schemas.microsoft.com/office/drawing/2014/main" id="{66AD0797-E42B-C143-2ABA-FE8A1BCE02A9}"/>
               </a:ext>
             </a:extLst>
           </p:cNvPr>
@@ -1397,7 +1397,7 @@
           <p:cNvPr id="5" name="Date Placeholder 4">
             <a:extLst>
               <a:ext uri="{FF2B5EF4-FFF2-40B4-BE49-F238E27FC236}">
-                <a16:creationId xmlns:a16="http://schemas.microsoft.com/office/drawing/2014/main" id="{5F77DE99-E277-D26C-864C-2DD97D76896D}"/>
+                <a16:creationId xmlns:a16="http://schemas.microsoft.com/office/drawing/2014/main" id="{391129C0-99B7-DF11-B6B6-5F95754F53F4}"/>
               </a:ext>
             </a:extLst>
           </p:cNvPr>
@@ -1413,9 +1413,9 @@
           <a:bodyPr/>
           <a:lstStyle/>
           <a:p>
-            <a:fld id="{38FBDE99-7FF3-4B2B-B24A-FAE4D0EE83AD}" type="datetimeFigureOut">
+            <a:fld id="{58478983-EB23-43A1-9ED0-C435A70E79D8}" type="datetimeFigureOut">
               <a:rPr lang="en-IN" smtClean="0"/>
-              <a:t>20-10-2025</a:t>
+              <a:t>29-10-2025</a:t>
             </a:fld>
             <a:endParaRPr lang="en-IN"/>
           </a:p>
@@ -1426,7 +1426,7 @@
           <p:cNvPr id="6" name="Footer Placeholder 5">
             <a:extLst>
               <a:ext uri="{FF2B5EF4-FFF2-40B4-BE49-F238E27FC236}">
-                <a16:creationId xmlns:a16="http://schemas.microsoft.com/office/drawing/2014/main" id="{6A9EDAAC-654E-0E78-E0DF-F9E9FF4C31A2}"/>
+                <a16:creationId xmlns:a16="http://schemas.microsoft.com/office/drawing/2014/main" id="{38B9BBD9-0DA0-50F8-EFEA-B6BF696C6721}"/>
               </a:ext>
             </a:extLst>
           </p:cNvPr>
@@ -1451,7 +1451,7 @@
           <p:cNvPr id="7" name="Slide Number Placeholder 6">
             <a:extLst>
               <a:ext uri="{FF2B5EF4-FFF2-40B4-BE49-F238E27FC236}">
-                <a16:creationId xmlns:a16="http://schemas.microsoft.com/office/drawing/2014/main" id="{E73156A2-4EE0-F847-8364-B68F140E1663}"/>
+                <a16:creationId xmlns:a16="http://schemas.microsoft.com/office/drawing/2014/main" id="{0C041321-26BC-1687-898C-8881095ABEE8}"/>
               </a:ext>
             </a:extLst>
           </p:cNvPr>
@@ -1467,7 +1467,7 @@
           <a:bodyPr/>
           <a:lstStyle/>
           <a:p>
-            <a:fld id="{250B4845-9CB7-44A7-AE6D-315ACAC19406}" type="slidenum">
+            <a:fld id="{5E132880-87CE-4965-B154-3BB573D01981}" type="slidenum">
               <a:rPr lang="en-IN" smtClean="0"/>
               <a:t>‹#›</a:t>
             </a:fld>
@@ -1478,7 +1478,7 @@
     </p:spTree>
     <p:extLst>
       <p:ext uri="{BB962C8B-B14F-4D97-AF65-F5344CB8AC3E}">
-        <p14:creationId xmlns:p14="http://schemas.microsoft.com/office/powerpoint/2010/main" val="3010870311"/>
+        <p14:creationId xmlns:p14="http://schemas.microsoft.com/office/powerpoint/2010/main" val="2051231139"/>
       </p:ext>
     </p:extLst>
   </p:cSld>
@@ -1510,7 +1510,7 @@
           <p:cNvPr id="2" name="Title 1">
             <a:extLst>
               <a:ext uri="{FF2B5EF4-FFF2-40B4-BE49-F238E27FC236}">
-                <a16:creationId xmlns:a16="http://schemas.microsoft.com/office/drawing/2014/main" id="{8FBA140E-B97C-EDDC-AEE5-5E67A01C8C57}"/>
+                <a16:creationId xmlns:a16="http://schemas.microsoft.com/office/drawing/2014/main" id="{B12BFD26-DA27-6C97-7499-22732BF5235C}"/>
               </a:ext>
             </a:extLst>
           </p:cNvPr>
@@ -1544,7 +1544,7 @@
           <p:cNvPr id="3" name="Text Placeholder 2">
             <a:extLst>
               <a:ext uri="{FF2B5EF4-FFF2-40B4-BE49-F238E27FC236}">
-                <a16:creationId xmlns:a16="http://schemas.microsoft.com/office/drawing/2014/main" id="{328FB96F-0229-605A-6016-AE93A543657E}"/>
+                <a16:creationId xmlns:a16="http://schemas.microsoft.com/office/drawing/2014/main" id="{B8DB742A-CE32-822F-9349-8D4E2A89B4B7}"/>
               </a:ext>
             </a:extLst>
           </p:cNvPr>
@@ -1615,7 +1615,7 @@
           <p:cNvPr id="4" name="Content Placeholder 3">
             <a:extLst>
               <a:ext uri="{FF2B5EF4-FFF2-40B4-BE49-F238E27FC236}">
-                <a16:creationId xmlns:a16="http://schemas.microsoft.com/office/drawing/2014/main" id="{210A2A4D-29AE-A815-9B78-F731D7B0849C}"/>
+                <a16:creationId xmlns:a16="http://schemas.microsoft.com/office/drawing/2014/main" id="{C0AEC34E-FA5F-D88F-C1AF-6F545A319A3D}"/>
               </a:ext>
             </a:extLst>
           </p:cNvPr>
@@ -1678,7 +1678,7 @@
           <p:cNvPr id="5" name="Text Placeholder 4">
             <a:extLst>
               <a:ext uri="{FF2B5EF4-FFF2-40B4-BE49-F238E27FC236}">
-                <a16:creationId xmlns:a16="http://schemas.microsoft.com/office/drawing/2014/main" id="{32671E50-5556-538A-317C-3DDAFC30880E}"/>
+                <a16:creationId xmlns:a16="http://schemas.microsoft.com/office/drawing/2014/main" id="{1F4A81E9-D53A-26EC-7F9C-1AD03D4261F9}"/>
               </a:ext>
             </a:extLst>
           </p:cNvPr>
@@ -1749,7 +1749,7 @@
           <p:cNvPr id="6" name="Content Placeholder 5">
             <a:extLst>
               <a:ext uri="{FF2B5EF4-FFF2-40B4-BE49-F238E27FC236}">
-                <a16:creationId xmlns:a16="http://schemas.microsoft.com/office/drawing/2014/main" id="{8EF48D1A-88A5-7249-3DBD-23166E5E4CB7}"/>
+                <a16:creationId xmlns:a16="http://schemas.microsoft.com/office/drawing/2014/main" id="{1A78FEE9-22DA-0223-C585-F0F5C95E7B6E}"/>
               </a:ext>
             </a:extLst>
           </p:cNvPr>
@@ -1812,7 +1812,7 @@
           <p:cNvPr id="7" name="Date Placeholder 6">
             <a:extLst>
               <a:ext uri="{FF2B5EF4-FFF2-40B4-BE49-F238E27FC236}">
-                <a16:creationId xmlns:a16="http://schemas.microsoft.com/office/drawing/2014/main" id="{6EE2ABFD-3E6C-5CA5-64CA-6C1D7F754FE9}"/>
+                <a16:creationId xmlns:a16="http://schemas.microsoft.com/office/drawing/2014/main" id="{CDF9D8A6-C109-9D8C-2A81-5D42D2121004}"/>
               </a:ext>
             </a:extLst>
           </p:cNvPr>
@@ -1828,9 +1828,9 @@
           <a:bodyPr/>
           <a:lstStyle/>
           <a:p>
-            <a:fld id="{38FBDE99-7FF3-4B2B-B24A-FAE4D0EE83AD}" type="datetimeFigureOut">
+            <a:fld id="{58478983-EB23-43A1-9ED0-C435A70E79D8}" type="datetimeFigureOut">
               <a:rPr lang="en-IN" smtClean="0"/>
-              <a:t>20-10-2025</a:t>
+              <a:t>29-10-2025</a:t>
             </a:fld>
             <a:endParaRPr lang="en-IN"/>
           </a:p>
@@ -1841,7 +1841,7 @@
           <p:cNvPr id="8" name="Footer Placeholder 7">
             <a:extLst>
               <a:ext uri="{FF2B5EF4-FFF2-40B4-BE49-F238E27FC236}">
-                <a16:creationId xmlns:a16="http://schemas.microsoft.com/office/drawing/2014/main" id="{40B6DA0B-D45A-8931-6E36-581382CB45C9}"/>
+                <a16:creationId xmlns:a16="http://schemas.microsoft.com/office/drawing/2014/main" id="{2E375B6F-4680-93B7-EE55-996370C06E4F}"/>
               </a:ext>
             </a:extLst>
           </p:cNvPr>
@@ -1866,7 +1866,7 @@
           <p:cNvPr id="9" name="Slide Number Placeholder 8">
             <a:extLst>
               <a:ext uri="{FF2B5EF4-FFF2-40B4-BE49-F238E27FC236}">
-                <a16:creationId xmlns:a16="http://schemas.microsoft.com/office/drawing/2014/main" id="{EECE5FA6-EB5F-D800-7A6B-69E42C8FD3C3}"/>
+                <a16:creationId xmlns:a16="http://schemas.microsoft.com/office/drawing/2014/main" id="{55DAFF45-047C-B11F-9558-59ADA99C12B7}"/>
               </a:ext>
             </a:extLst>
           </p:cNvPr>
@@ -1882,7 +1882,7 @@
           <a:bodyPr/>
           <a:lstStyle/>
           <a:p>
-            <a:fld id="{250B4845-9CB7-44A7-AE6D-315ACAC19406}" type="slidenum">
+            <a:fld id="{5E132880-87CE-4965-B154-3BB573D01981}" type="slidenum">
               <a:rPr lang="en-IN" smtClean="0"/>
               <a:t>‹#›</a:t>
             </a:fld>
@@ -1893,7 +1893,7 @@
     </p:spTree>
     <p:extLst>
       <p:ext uri="{BB962C8B-B14F-4D97-AF65-F5344CB8AC3E}">
-        <p14:creationId xmlns:p14="http://schemas.microsoft.com/office/powerpoint/2010/main" val="4169667635"/>
+        <p14:creationId xmlns:p14="http://schemas.microsoft.com/office/powerpoint/2010/main" val="3014251216"/>
       </p:ext>
     </p:extLst>
   </p:cSld>
@@ -1925,7 +1925,7 @@
           <p:cNvPr id="2" name="Title 1">
             <a:extLst>
               <a:ext uri="{FF2B5EF4-FFF2-40B4-BE49-F238E27FC236}">
-                <a16:creationId xmlns:a16="http://schemas.microsoft.com/office/drawing/2014/main" id="{5421AF80-508D-F65C-8C93-88C79F3D9D1B}"/>
+                <a16:creationId xmlns:a16="http://schemas.microsoft.com/office/drawing/2014/main" id="{06D397C8-7E82-4114-655E-DF658EFEAA17}"/>
               </a:ext>
             </a:extLst>
           </p:cNvPr>
@@ -1954,7 +1954,7 @@
           <p:cNvPr id="3" name="Date Placeholder 2">
             <a:extLst>
               <a:ext uri="{FF2B5EF4-FFF2-40B4-BE49-F238E27FC236}">
-                <a16:creationId xmlns:a16="http://schemas.microsoft.com/office/drawing/2014/main" id="{D89DD1E8-5BCB-F288-7BB5-327ACAFD6B71}"/>
+                <a16:creationId xmlns:a16="http://schemas.microsoft.com/office/drawing/2014/main" id="{FE5FA3A3-2B96-A67D-68C1-E7BAA45AF250}"/>
               </a:ext>
             </a:extLst>
           </p:cNvPr>
@@ -1970,9 +1970,9 @@
           <a:bodyPr/>
           <a:lstStyle/>
           <a:p>
-            <a:fld id="{38FBDE99-7FF3-4B2B-B24A-FAE4D0EE83AD}" type="datetimeFigureOut">
+            <a:fld id="{58478983-EB23-43A1-9ED0-C435A70E79D8}" type="datetimeFigureOut">
               <a:rPr lang="en-IN" smtClean="0"/>
-              <a:t>20-10-2025</a:t>
+              <a:t>29-10-2025</a:t>
             </a:fld>
             <a:endParaRPr lang="en-IN"/>
           </a:p>
@@ -1983,7 +1983,7 @@
           <p:cNvPr id="4" name="Footer Placeholder 3">
             <a:extLst>
               <a:ext uri="{FF2B5EF4-FFF2-40B4-BE49-F238E27FC236}">
-                <a16:creationId xmlns:a16="http://schemas.microsoft.com/office/drawing/2014/main" id="{F0956642-1EC8-9CA4-1B14-A1DDA0CBFC21}"/>
+                <a16:creationId xmlns:a16="http://schemas.microsoft.com/office/drawing/2014/main" id="{13278AE5-38DA-BCF1-C1A8-1C8C4A95985C}"/>
               </a:ext>
             </a:extLst>
           </p:cNvPr>
@@ -2008,7 +2008,7 @@
           <p:cNvPr id="5" name="Slide Number Placeholder 4">
             <a:extLst>
               <a:ext uri="{FF2B5EF4-FFF2-40B4-BE49-F238E27FC236}">
-                <a16:creationId xmlns:a16="http://schemas.microsoft.com/office/drawing/2014/main" id="{D9E7E314-F274-68BD-8ADF-8C353709B3A2}"/>
+                <a16:creationId xmlns:a16="http://schemas.microsoft.com/office/drawing/2014/main" id="{B7889FEB-B2C9-68A2-E76A-7448A3F65361}"/>
               </a:ext>
             </a:extLst>
           </p:cNvPr>
@@ -2024,7 +2024,7 @@
           <a:bodyPr/>
           <a:lstStyle/>
           <a:p>
-            <a:fld id="{250B4845-9CB7-44A7-AE6D-315ACAC19406}" type="slidenum">
+            <a:fld id="{5E132880-87CE-4965-B154-3BB573D01981}" type="slidenum">
               <a:rPr lang="en-IN" smtClean="0"/>
               <a:t>‹#›</a:t>
             </a:fld>
@@ -2035,7 +2035,7 @@
     </p:spTree>
     <p:extLst>
       <p:ext uri="{BB962C8B-B14F-4D97-AF65-F5344CB8AC3E}">
-        <p14:creationId xmlns:p14="http://schemas.microsoft.com/office/powerpoint/2010/main" val="429128890"/>
+        <p14:creationId xmlns:p14="http://schemas.microsoft.com/office/powerpoint/2010/main" val="1022060974"/>
       </p:ext>
     </p:extLst>
   </p:cSld>
@@ -2067,7 +2067,7 @@
           <p:cNvPr id="2" name="Date Placeholder 1">
             <a:extLst>
               <a:ext uri="{FF2B5EF4-FFF2-40B4-BE49-F238E27FC236}">
-                <a16:creationId xmlns:a16="http://schemas.microsoft.com/office/drawing/2014/main" id="{77283E25-1230-8E69-03E6-30572091AC28}"/>
+                <a16:creationId xmlns:a16="http://schemas.microsoft.com/office/drawing/2014/main" id="{B7285DE4-D98B-1DBD-33EC-5555EBB29A77}"/>
               </a:ext>
             </a:extLst>
           </p:cNvPr>
@@ -2083,9 +2083,9 @@
           <a:bodyPr/>
           <a:lstStyle/>
           <a:p>
-            <a:fld id="{38FBDE99-7FF3-4B2B-B24A-FAE4D0EE83AD}" type="datetimeFigureOut">
+            <a:fld id="{58478983-EB23-43A1-9ED0-C435A70E79D8}" type="datetimeFigureOut">
               <a:rPr lang="en-IN" smtClean="0"/>
-              <a:t>20-10-2025</a:t>
+              <a:t>29-10-2025</a:t>
             </a:fld>
             <a:endParaRPr lang="en-IN"/>
           </a:p>
@@ -2096,7 +2096,7 @@
           <p:cNvPr id="3" name="Footer Placeholder 2">
             <a:extLst>
               <a:ext uri="{FF2B5EF4-FFF2-40B4-BE49-F238E27FC236}">
-                <a16:creationId xmlns:a16="http://schemas.microsoft.com/office/drawing/2014/main" id="{21E59EF8-5445-9CB8-F877-1B6B8527E85F}"/>
+                <a16:creationId xmlns:a16="http://schemas.microsoft.com/office/drawing/2014/main" id="{12639838-8312-95EB-AA57-77E68ED75E0C}"/>
               </a:ext>
             </a:extLst>
           </p:cNvPr>
@@ -2121,7 +2121,7 @@
           <p:cNvPr id="4" name="Slide Number Placeholder 3">
             <a:extLst>
               <a:ext uri="{FF2B5EF4-FFF2-40B4-BE49-F238E27FC236}">
-                <a16:creationId xmlns:a16="http://schemas.microsoft.com/office/drawing/2014/main" id="{E5EFA929-88D5-F9BC-F9E8-816C037821BB}"/>
+                <a16:creationId xmlns:a16="http://schemas.microsoft.com/office/drawing/2014/main" id="{27457A22-A3EF-547F-A104-9CB7ACE8E34A}"/>
               </a:ext>
             </a:extLst>
           </p:cNvPr>
@@ -2137,7 +2137,7 @@
           <a:bodyPr/>
           <a:lstStyle/>
           <a:p>
-            <a:fld id="{250B4845-9CB7-44A7-AE6D-315ACAC19406}" type="slidenum">
+            <a:fld id="{5E132880-87CE-4965-B154-3BB573D01981}" type="slidenum">
               <a:rPr lang="en-IN" smtClean="0"/>
               <a:t>‹#›</a:t>
             </a:fld>
@@ -2148,7 +2148,7 @@
     </p:spTree>
     <p:extLst>
       <p:ext uri="{BB962C8B-B14F-4D97-AF65-F5344CB8AC3E}">
-        <p14:creationId xmlns:p14="http://schemas.microsoft.com/office/powerpoint/2010/main" val="3540331303"/>
+        <p14:creationId xmlns:p14="http://schemas.microsoft.com/office/powerpoint/2010/main" val="2150899704"/>
       </p:ext>
     </p:extLst>
   </p:cSld>
@@ -2180,7 +2180,7 @@
           <p:cNvPr id="2" name="Title 1">
             <a:extLst>
               <a:ext uri="{FF2B5EF4-FFF2-40B4-BE49-F238E27FC236}">
-                <a16:creationId xmlns:a16="http://schemas.microsoft.com/office/drawing/2014/main" id="{49A199F5-96A7-727F-E798-B21D3A466DF7}"/>
+                <a16:creationId xmlns:a16="http://schemas.microsoft.com/office/drawing/2014/main" id="{51A4857B-AB55-D4C3-7851-FA4930E127D2}"/>
               </a:ext>
             </a:extLst>
           </p:cNvPr>
@@ -2218,7 +2218,7 @@
           <p:cNvPr id="3" name="Content Placeholder 2">
             <a:extLst>
               <a:ext uri="{FF2B5EF4-FFF2-40B4-BE49-F238E27FC236}">
-                <a16:creationId xmlns:a16="http://schemas.microsoft.com/office/drawing/2014/main" id="{DC3387E0-2F58-BC37-D9EC-707077726B32}"/>
+                <a16:creationId xmlns:a16="http://schemas.microsoft.com/office/drawing/2014/main" id="{F5F97EA2-CE01-0C46-F5D4-57FC9B49727A}"/>
               </a:ext>
             </a:extLst>
           </p:cNvPr>
@@ -2309,7 +2309,7 @@
           <p:cNvPr id="4" name="Text Placeholder 3">
             <a:extLst>
               <a:ext uri="{FF2B5EF4-FFF2-40B4-BE49-F238E27FC236}">
-                <a16:creationId xmlns:a16="http://schemas.microsoft.com/office/drawing/2014/main" id="{1DAF8609-46AE-F74A-4959-34E925212716}"/>
+                <a16:creationId xmlns:a16="http://schemas.microsoft.com/office/drawing/2014/main" id="{ACA7FD44-B28F-C635-DEEB-9B988D685958}"/>
               </a:ext>
             </a:extLst>
           </p:cNvPr>
@@ -2380,7 +2380,7 @@
           <p:cNvPr id="5" name="Date Placeholder 4">
             <a:extLst>
               <a:ext uri="{FF2B5EF4-FFF2-40B4-BE49-F238E27FC236}">
-                <a16:creationId xmlns:a16="http://schemas.microsoft.com/office/drawing/2014/main" id="{7D83C811-2490-CDCE-095E-8328C95E4B6C}"/>
+                <a16:creationId xmlns:a16="http://schemas.microsoft.com/office/drawing/2014/main" id="{25BFC24F-0E8A-F20B-BA38-BB11BCB5BF25}"/>
               </a:ext>
             </a:extLst>
           </p:cNvPr>
@@ -2396,9 +2396,9 @@
           <a:bodyPr/>
           <a:lstStyle/>
           <a:p>
-            <a:fld id="{38FBDE99-7FF3-4B2B-B24A-FAE4D0EE83AD}" type="datetimeFigureOut">
+            <a:fld id="{58478983-EB23-43A1-9ED0-C435A70E79D8}" type="datetimeFigureOut">
               <a:rPr lang="en-IN" smtClean="0"/>
-              <a:t>20-10-2025</a:t>
+              <a:t>29-10-2025</a:t>
             </a:fld>
             <a:endParaRPr lang="en-IN"/>
           </a:p>
@@ -2409,7 +2409,7 @@
           <p:cNvPr id="6" name="Footer Placeholder 5">
             <a:extLst>
               <a:ext uri="{FF2B5EF4-FFF2-40B4-BE49-F238E27FC236}">
-                <a16:creationId xmlns:a16="http://schemas.microsoft.com/office/drawing/2014/main" id="{9964ADAF-8399-214F-6D39-069D1CEB45C9}"/>
+                <a16:creationId xmlns:a16="http://schemas.microsoft.com/office/drawing/2014/main" id="{E0A6D8A6-C241-D862-174A-B2533565DB56}"/>
               </a:ext>
             </a:extLst>
           </p:cNvPr>
@@ -2434,7 +2434,7 @@
           <p:cNvPr id="7" name="Slide Number Placeholder 6">
             <a:extLst>
               <a:ext uri="{FF2B5EF4-FFF2-40B4-BE49-F238E27FC236}">
-                <a16:creationId xmlns:a16="http://schemas.microsoft.com/office/drawing/2014/main" id="{F26C8E9D-7EF7-816E-4B7D-ACCEC0F9DFEF}"/>
+                <a16:creationId xmlns:a16="http://schemas.microsoft.com/office/drawing/2014/main" id="{20B94D14-5412-B828-CADC-8ACA3062749F}"/>
               </a:ext>
             </a:extLst>
           </p:cNvPr>
@@ -2450,7 +2450,7 @@
           <a:bodyPr/>
           <a:lstStyle/>
           <a:p>
-            <a:fld id="{250B4845-9CB7-44A7-AE6D-315ACAC19406}" type="slidenum">
+            <a:fld id="{5E132880-87CE-4965-B154-3BB573D01981}" type="slidenum">
               <a:rPr lang="en-IN" smtClean="0"/>
               <a:t>‹#›</a:t>
             </a:fld>
@@ -2461,7 +2461,7 @@
     </p:spTree>
     <p:extLst>
       <p:ext uri="{BB962C8B-B14F-4D97-AF65-F5344CB8AC3E}">
-        <p14:creationId xmlns:p14="http://schemas.microsoft.com/office/powerpoint/2010/main" val="1232497614"/>
+        <p14:creationId xmlns:p14="http://schemas.microsoft.com/office/powerpoint/2010/main" val="268786327"/>
       </p:ext>
     </p:extLst>
   </p:cSld>
@@ -2493,7 +2493,7 @@
           <p:cNvPr id="2" name="Title 1">
             <a:extLst>
               <a:ext uri="{FF2B5EF4-FFF2-40B4-BE49-F238E27FC236}">
-                <a16:creationId xmlns:a16="http://schemas.microsoft.com/office/drawing/2014/main" id="{0A3DFAD2-2305-9B0E-4B6B-270F935E2E01}"/>
+                <a16:creationId xmlns:a16="http://schemas.microsoft.com/office/drawing/2014/main" id="{959C57F3-1CC2-E76B-F3E1-6895FB28B17B}"/>
               </a:ext>
             </a:extLst>
           </p:cNvPr>
@@ -2531,7 +2531,7 @@
           <p:cNvPr id="3" name="Picture Placeholder 2">
             <a:extLst>
               <a:ext uri="{FF2B5EF4-FFF2-40B4-BE49-F238E27FC236}">
-                <a16:creationId xmlns:a16="http://schemas.microsoft.com/office/drawing/2014/main" id="{5BDF7130-2C58-7064-9733-2FA41ACE7BBD}"/>
+                <a16:creationId xmlns:a16="http://schemas.microsoft.com/office/drawing/2014/main" id="{9FCB2815-E547-8BC2-01DA-9313EC3BC0A6}"/>
               </a:ext>
             </a:extLst>
           </p:cNvPr>
@@ -2598,7 +2598,7 @@
           <p:cNvPr id="4" name="Text Placeholder 3">
             <a:extLst>
               <a:ext uri="{FF2B5EF4-FFF2-40B4-BE49-F238E27FC236}">
-                <a16:creationId xmlns:a16="http://schemas.microsoft.com/office/drawing/2014/main" id="{16B4CA00-B2F9-CD3F-E7A0-592C34A279BE}"/>
+                <a16:creationId xmlns:a16="http://schemas.microsoft.com/office/drawing/2014/main" id="{F44E0CA6-B25C-A4EC-2B5F-1C2DEC990524}"/>
               </a:ext>
             </a:extLst>
           </p:cNvPr>
@@ -2669,7 +2669,7 @@
           <p:cNvPr id="5" name="Date Placeholder 4">
             <a:extLst>
               <a:ext uri="{FF2B5EF4-FFF2-40B4-BE49-F238E27FC236}">
-                <a16:creationId xmlns:a16="http://schemas.microsoft.com/office/drawing/2014/main" id="{6BEF2DD8-73B6-8675-991A-3A1187C58037}"/>
+                <a16:creationId xmlns:a16="http://schemas.microsoft.com/office/drawing/2014/main" id="{487F4258-C09C-DB0E-3C6A-4715F71A4B55}"/>
               </a:ext>
             </a:extLst>
           </p:cNvPr>
@@ -2685,9 +2685,9 @@
           <a:bodyPr/>
           <a:lstStyle/>
           <a:p>
-            <a:fld id="{38FBDE99-7FF3-4B2B-B24A-FAE4D0EE83AD}" type="datetimeFigureOut">
+            <a:fld id="{58478983-EB23-43A1-9ED0-C435A70E79D8}" type="datetimeFigureOut">
               <a:rPr lang="en-IN" smtClean="0"/>
-              <a:t>20-10-2025</a:t>
+              <a:t>29-10-2025</a:t>
             </a:fld>
             <a:endParaRPr lang="en-IN"/>
           </a:p>
@@ -2698,7 +2698,7 @@
           <p:cNvPr id="6" name="Footer Placeholder 5">
             <a:extLst>
               <a:ext uri="{FF2B5EF4-FFF2-40B4-BE49-F238E27FC236}">
-                <a16:creationId xmlns:a16="http://schemas.microsoft.com/office/drawing/2014/main" id="{B7C82DEF-22E6-B862-3BFB-8655653769CB}"/>
+                <a16:creationId xmlns:a16="http://schemas.microsoft.com/office/drawing/2014/main" id="{913880D9-1B39-BF3C-DBAE-D490D6D6B729}"/>
               </a:ext>
             </a:extLst>
           </p:cNvPr>
@@ -2723,7 +2723,7 @@
           <p:cNvPr id="7" name="Slide Number Placeholder 6">
             <a:extLst>
               <a:ext uri="{FF2B5EF4-FFF2-40B4-BE49-F238E27FC236}">
-                <a16:creationId xmlns:a16="http://schemas.microsoft.com/office/drawing/2014/main" id="{22339C76-865C-5735-488F-3CB628057667}"/>
+                <a16:creationId xmlns:a16="http://schemas.microsoft.com/office/drawing/2014/main" id="{77ACFB73-A636-73B9-F68C-6290393470D1}"/>
               </a:ext>
             </a:extLst>
           </p:cNvPr>
@@ -2739,7 +2739,7 @@
           <a:bodyPr/>
           <a:lstStyle/>
           <a:p>
-            <a:fld id="{250B4845-9CB7-44A7-AE6D-315ACAC19406}" type="slidenum">
+            <a:fld id="{5E132880-87CE-4965-B154-3BB573D01981}" type="slidenum">
               <a:rPr lang="en-IN" smtClean="0"/>
               <a:t>‹#›</a:t>
             </a:fld>
@@ -2750,7 +2750,7 @@
     </p:spTree>
     <p:extLst>
       <p:ext uri="{BB962C8B-B14F-4D97-AF65-F5344CB8AC3E}">
-        <p14:creationId xmlns:p14="http://schemas.microsoft.com/office/powerpoint/2010/main" val="2426873282"/>
+        <p14:creationId xmlns:p14="http://schemas.microsoft.com/office/powerpoint/2010/main" val="56062528"/>
       </p:ext>
     </p:extLst>
   </p:cSld>
@@ -2787,7 +2787,7 @@
           <p:cNvPr id="2" name="Title Placeholder 1">
             <a:extLst>
               <a:ext uri="{FF2B5EF4-FFF2-40B4-BE49-F238E27FC236}">
-                <a16:creationId xmlns:a16="http://schemas.microsoft.com/office/drawing/2014/main" id="{DCE2CD8F-B094-B54D-66DD-EC385C0A0200}"/>
+                <a16:creationId xmlns:a16="http://schemas.microsoft.com/office/drawing/2014/main" id="{3EC5A8DF-9561-DDF7-7948-685D5516B57C}"/>
               </a:ext>
             </a:extLst>
           </p:cNvPr>
@@ -2826,7 +2826,7 @@
           <p:cNvPr id="3" name="Text Placeholder 2">
             <a:extLst>
               <a:ext uri="{FF2B5EF4-FFF2-40B4-BE49-F238E27FC236}">
-                <a16:creationId xmlns:a16="http://schemas.microsoft.com/office/drawing/2014/main" id="{9D999085-3EE3-2975-C3B5-79C123A090AF}"/>
+                <a16:creationId xmlns:a16="http://schemas.microsoft.com/office/drawing/2014/main" id="{A671F6E3-A6B4-3ACA-43B1-6D79EADA498C}"/>
               </a:ext>
             </a:extLst>
           </p:cNvPr>
@@ -2894,7 +2894,7 @@
           <p:cNvPr id="4" name="Date Placeholder 3">
             <a:extLst>
               <a:ext uri="{FF2B5EF4-FFF2-40B4-BE49-F238E27FC236}">
-                <a16:creationId xmlns:a16="http://schemas.microsoft.com/office/drawing/2014/main" id="{ADFF6F8D-C89E-AB68-62CD-9920E02B25E3}"/>
+                <a16:creationId xmlns:a16="http://schemas.microsoft.com/office/drawing/2014/main" id="{2E21CC17-C158-11F8-B3E7-25729E4635F6}"/>
               </a:ext>
             </a:extLst>
           </p:cNvPr>
@@ -2928,9 +2928,9 @@
             </a:lvl1pPr>
           </a:lstStyle>
           <a:p>
-            <a:fld id="{38FBDE99-7FF3-4B2B-B24A-FAE4D0EE83AD}" type="datetimeFigureOut">
+            <a:fld id="{58478983-EB23-43A1-9ED0-C435A70E79D8}" type="datetimeFigureOut">
               <a:rPr lang="en-IN" smtClean="0"/>
-              <a:t>20-10-2025</a:t>
+              <a:t>29-10-2025</a:t>
             </a:fld>
             <a:endParaRPr lang="en-IN"/>
           </a:p>
@@ -2941,7 +2941,7 @@
           <p:cNvPr id="5" name="Footer Placeholder 4">
             <a:extLst>
               <a:ext uri="{FF2B5EF4-FFF2-40B4-BE49-F238E27FC236}">
-                <a16:creationId xmlns:a16="http://schemas.microsoft.com/office/drawing/2014/main" id="{8052EE60-6FBD-D66E-CFA4-A312D1108AB2}"/>
+                <a16:creationId xmlns:a16="http://schemas.microsoft.com/office/drawing/2014/main" id="{86F61B7B-FE05-CFA4-53A5-BB7290D8D04D}"/>
               </a:ext>
             </a:extLst>
           </p:cNvPr>
@@ -2984,7 +2984,7 @@
           <p:cNvPr id="6" name="Slide Number Placeholder 5">
             <a:extLst>
               <a:ext uri="{FF2B5EF4-FFF2-40B4-BE49-F238E27FC236}">
-                <a16:creationId xmlns:a16="http://schemas.microsoft.com/office/drawing/2014/main" id="{B161357B-DFB2-2687-2FAB-DE5715725983}"/>
+                <a16:creationId xmlns:a16="http://schemas.microsoft.com/office/drawing/2014/main" id="{5D148835-51E2-F314-578D-8EC3766002CF}"/>
               </a:ext>
             </a:extLst>
           </p:cNvPr>
@@ -3018,7 +3018,7 @@
             </a:lvl1pPr>
           </a:lstStyle>
           <a:p>
-            <a:fld id="{250B4845-9CB7-44A7-AE6D-315ACAC19406}" type="slidenum">
+            <a:fld id="{5E132880-87CE-4965-B154-3BB573D01981}" type="slidenum">
               <a:rPr lang="en-IN" smtClean="0"/>
               <a:t>‹#›</a:t>
             </a:fld>
@@ -3029,7 +3029,7 @@
     </p:spTree>
     <p:extLst>
       <p:ext uri="{BB962C8B-B14F-4D97-AF65-F5344CB8AC3E}">
-        <p14:creationId xmlns:p14="http://schemas.microsoft.com/office/powerpoint/2010/main" val="382387985"/>
+        <p14:creationId xmlns:p14="http://schemas.microsoft.com/office/powerpoint/2010/main" val="2897529686"/>
       </p:ext>
     </p:extLst>
   </p:cSld>
@@ -3349,10 +3349,10 @@
       </p:grpSpPr>
       <p:pic>
         <p:nvPicPr>
-          <p:cNvPr id="5" name="Picture 4">
-            <a:extLst>
-              <a:ext uri="{FF2B5EF4-FFF2-40B4-BE49-F238E27FC236}">
-                <a16:creationId xmlns:a16="http://schemas.microsoft.com/office/drawing/2014/main" id="{A54AF7E7-97BF-A134-60AB-E6B67B7472E2}"/>
+          <p:cNvPr id="7" name="Picture 6">
+            <a:extLst>
+              <a:ext uri="{FF2B5EF4-FFF2-40B4-BE49-F238E27FC236}">
+                <a16:creationId xmlns:a16="http://schemas.microsoft.com/office/drawing/2014/main" id="{C06DD561-2971-5CC0-8727-842E93E65AC9}"/>
               </a:ext>
             </a:extLst>
           </p:cNvPr>
@@ -3386,7 +3386,7 @@
     </p:spTree>
     <p:extLst>
       <p:ext uri="{BB962C8B-B14F-4D97-AF65-F5344CB8AC3E}">
-        <p14:creationId xmlns:p14="http://schemas.microsoft.com/office/powerpoint/2010/main" val="3674426101"/>
+        <p14:creationId xmlns:p14="http://schemas.microsoft.com/office/powerpoint/2010/main" val="254189550"/>
       </p:ext>
     </p:extLst>
   </p:cSld>
@@ -3404,7 +3404,7 @@
         <p:cNvPr id="1" name="">
           <a:extLst>
             <a:ext uri="{FF2B5EF4-FFF2-40B4-BE49-F238E27FC236}">
-              <a16:creationId xmlns:a16="http://schemas.microsoft.com/office/drawing/2014/main" id="{326C75A3-1A13-801D-D79B-B5D91DBD031C}"/>
+              <a16:creationId xmlns:a16="http://schemas.microsoft.com/office/drawing/2014/main" id="{FED3A0EF-25C1-A72E-7969-8B42C90FAD65}"/>
             </a:ext>
           </a:extLst>
         </p:cNvPr>
@@ -3424,7 +3424,7 @@
           <p:cNvPr id="3" name="Picture 2">
             <a:extLst>
               <a:ext uri="{FF2B5EF4-FFF2-40B4-BE49-F238E27FC236}">
-                <a16:creationId xmlns:a16="http://schemas.microsoft.com/office/drawing/2014/main" id="{417FC629-8C94-95B8-4884-31639E6B7FD3}"/>
+                <a16:creationId xmlns:a16="http://schemas.microsoft.com/office/drawing/2014/main" id="{D63722AE-DC79-970C-0E60-F260A56BBD9A}"/>
               </a:ext>
             </a:extLst>
           </p:cNvPr>
@@ -3458,7 +3458,7 @@
     </p:spTree>
     <p:extLst>
       <p:ext uri="{BB962C8B-B14F-4D97-AF65-F5344CB8AC3E}">
-        <p14:creationId xmlns:p14="http://schemas.microsoft.com/office/powerpoint/2010/main" val="2994842185"/>
+        <p14:creationId xmlns:p14="http://schemas.microsoft.com/office/powerpoint/2010/main" val="2285272089"/>
       </p:ext>
     </p:extLst>
   </p:cSld>
@@ -3476,7 +3476,7 @@
         <p:cNvPr id="1" name="">
           <a:extLst>
             <a:ext uri="{FF2B5EF4-FFF2-40B4-BE49-F238E27FC236}">
-              <a16:creationId xmlns:a16="http://schemas.microsoft.com/office/drawing/2014/main" id="{3C4C8359-EC6E-44A5-50B3-B7900E6F692D}"/>
+              <a16:creationId xmlns:a16="http://schemas.microsoft.com/office/drawing/2014/main" id="{3B2AB7BE-9631-ACBF-6FBF-17A95B2A4D64}"/>
             </a:ext>
           </a:extLst>
         </p:cNvPr>
@@ -3496,7 +3496,7 @@
           <p:cNvPr id="3" name="Picture 2">
             <a:extLst>
               <a:ext uri="{FF2B5EF4-FFF2-40B4-BE49-F238E27FC236}">
-                <a16:creationId xmlns:a16="http://schemas.microsoft.com/office/drawing/2014/main" id="{0B2F42E2-FA89-74D3-9A1B-2C15F1751E1A}"/>
+                <a16:creationId xmlns:a16="http://schemas.microsoft.com/office/drawing/2014/main" id="{03267934-C36E-BD89-A695-BB0686AFFC4A}"/>
               </a:ext>
             </a:extLst>
           </p:cNvPr>
@@ -3530,7 +3530,7 @@
     </p:spTree>
     <p:extLst>
       <p:ext uri="{BB962C8B-B14F-4D97-AF65-F5344CB8AC3E}">
-        <p14:creationId xmlns:p14="http://schemas.microsoft.com/office/powerpoint/2010/main" val="971390963"/>
+        <p14:creationId xmlns:p14="http://schemas.microsoft.com/office/powerpoint/2010/main" val="3754428611"/>
       </p:ext>
     </p:extLst>
   </p:cSld>
@@ -3548,7 +3548,7 @@
         <p:cNvPr id="1" name="">
           <a:extLst>
             <a:ext uri="{FF2B5EF4-FFF2-40B4-BE49-F238E27FC236}">
-              <a16:creationId xmlns:a16="http://schemas.microsoft.com/office/drawing/2014/main" id="{C920B439-98DA-BBA9-57BD-CFAA7842C700}"/>
+              <a16:creationId xmlns:a16="http://schemas.microsoft.com/office/drawing/2014/main" id="{7E208578-C081-E29C-43B3-340B1C609A82}"/>
             </a:ext>
           </a:extLst>
         </p:cNvPr>
@@ -3568,7 +3568,7 @@
           <p:cNvPr id="3" name="Picture 2">
             <a:extLst>
               <a:ext uri="{FF2B5EF4-FFF2-40B4-BE49-F238E27FC236}">
-                <a16:creationId xmlns:a16="http://schemas.microsoft.com/office/drawing/2014/main" id="{5CEF0282-F192-4A81-E1D1-6B0CBEAC2764}"/>
+                <a16:creationId xmlns:a16="http://schemas.microsoft.com/office/drawing/2014/main" id="{A601CB77-A8E4-F610-2C20-388E392E0B00}"/>
               </a:ext>
             </a:extLst>
           </p:cNvPr>
@@ -3602,7 +3602,7 @@
     </p:spTree>
     <p:extLst>
       <p:ext uri="{BB962C8B-B14F-4D97-AF65-F5344CB8AC3E}">
-        <p14:creationId xmlns:p14="http://schemas.microsoft.com/office/powerpoint/2010/main" val="2631239257"/>
+        <p14:creationId xmlns:p14="http://schemas.microsoft.com/office/powerpoint/2010/main" val="1053872122"/>
       </p:ext>
     </p:extLst>
   </p:cSld>
@@ -3620,7 +3620,7 @@
         <p:cNvPr id="1" name="">
           <a:extLst>
             <a:ext uri="{FF2B5EF4-FFF2-40B4-BE49-F238E27FC236}">
-              <a16:creationId xmlns:a16="http://schemas.microsoft.com/office/drawing/2014/main" id="{F8AD9405-50A8-1734-A6A1-6F05B36BC5DB}"/>
+              <a16:creationId xmlns:a16="http://schemas.microsoft.com/office/drawing/2014/main" id="{0F2940A1-1879-32DA-E873-2CBC3F56FC8E}"/>
             </a:ext>
           </a:extLst>
         </p:cNvPr>
@@ -3640,7 +3640,7 @@
           <p:cNvPr id="3" name="Picture 2">
             <a:extLst>
               <a:ext uri="{FF2B5EF4-FFF2-40B4-BE49-F238E27FC236}">
-                <a16:creationId xmlns:a16="http://schemas.microsoft.com/office/drawing/2014/main" id="{84193CA0-DD3B-15CB-52CC-2100502C7873}"/>
+                <a16:creationId xmlns:a16="http://schemas.microsoft.com/office/drawing/2014/main" id="{B0931593-A63E-839E-25EE-D19220DAD619}"/>
               </a:ext>
             </a:extLst>
           </p:cNvPr>
@@ -3674,7 +3674,7 @@
     </p:spTree>
     <p:extLst>
       <p:ext uri="{BB962C8B-B14F-4D97-AF65-F5344CB8AC3E}">
-        <p14:creationId xmlns:p14="http://schemas.microsoft.com/office/powerpoint/2010/main" val="972356810"/>
+        <p14:creationId xmlns:p14="http://schemas.microsoft.com/office/powerpoint/2010/main" val="3117311324"/>
       </p:ext>
     </p:extLst>
   </p:cSld>
@@ -3692,7 +3692,7 @@
         <p:cNvPr id="1" name="">
           <a:extLst>
             <a:ext uri="{FF2B5EF4-FFF2-40B4-BE49-F238E27FC236}">
-              <a16:creationId xmlns:a16="http://schemas.microsoft.com/office/drawing/2014/main" id="{309C47C3-F2E1-2EBA-1EB5-A4DDCA5EDDDF}"/>
+              <a16:creationId xmlns:a16="http://schemas.microsoft.com/office/drawing/2014/main" id="{1EABDD8D-2FD2-7B24-5628-F2947B2DDA66}"/>
             </a:ext>
           </a:extLst>
         </p:cNvPr>
@@ -3712,7 +3712,7 @@
           <p:cNvPr id="3" name="Picture 2">
             <a:extLst>
               <a:ext uri="{FF2B5EF4-FFF2-40B4-BE49-F238E27FC236}">
-                <a16:creationId xmlns:a16="http://schemas.microsoft.com/office/drawing/2014/main" id="{41F8E640-9869-EF70-1C0B-97A3A9E955A9}"/>
+                <a16:creationId xmlns:a16="http://schemas.microsoft.com/office/drawing/2014/main" id="{F8491735-0F5E-9958-B987-08808B98E3F1}"/>
               </a:ext>
             </a:extLst>
           </p:cNvPr>
@@ -3746,7 +3746,7 @@
     </p:spTree>
     <p:extLst>
       <p:ext uri="{BB962C8B-B14F-4D97-AF65-F5344CB8AC3E}">
-        <p14:creationId xmlns:p14="http://schemas.microsoft.com/office/powerpoint/2010/main" val="2066224352"/>
+        <p14:creationId xmlns:p14="http://schemas.microsoft.com/office/powerpoint/2010/main" val="58935642"/>
       </p:ext>
     </p:extLst>
   </p:cSld>

</xml_diff>